<commit_message>
Updates and various fixes to the content
</commit_message>
<xml_diff>
--- a/02-why_write_tests_why_is_that_hard.pptx
+++ b/02-why_write_tests_why_is_that_hard.pptx
@@ -6611,7 +6611,7 @@
               <a:pPr>
                 <a:defRPr/>
               </a:pPr>
-              <a:t>2016-02-29</a:t>
+              <a:t>2016-04-12</a:t>
             </a:fld>
             <a:endParaRPr lang="en-US" dirty="0"/>
           </a:p>
@@ -6794,7 +6794,7 @@
               <a:pPr>
                 <a:defRPr/>
               </a:pPr>
-              <a:t>2016-02-29</a:t>
+              <a:t>2016-04-12</a:t>
             </a:fld>
             <a:endParaRPr lang="en-US" dirty="0"/>
           </a:p>
@@ -10397,14 +10397,14 @@
           </a:ln>
           <a:extLst>
             <a:ext uri="{909E8E84-426E-40dd-AFC4-6F175D3DCCD1}">
-              <a14:hiddenFill xmlns:a14="http://schemas.microsoft.com/office/drawing/2010/main" xmlns="">
+              <a14:hiddenFill xmlns="" xmlns:a14="http://schemas.microsoft.com/office/drawing/2010/main">
                 <a:solidFill>
                   <a:srgbClr val="FFFFFF"/>
                 </a:solidFill>
               </a14:hiddenFill>
             </a:ext>
             <a:ext uri="{91240B29-F687-4f45-9708-019B960494DF}">
-              <a14:hiddenLine xmlns:a14="http://schemas.microsoft.com/office/drawing/2010/main" xmlns="" w="9525">
+              <a14:hiddenLine xmlns="" xmlns:a14="http://schemas.microsoft.com/office/drawing/2010/main" w="9525">
                 <a:solidFill>
                   <a:srgbClr val="000000"/>
                 </a:solidFill>
@@ -10552,14 +10552,14 @@
           </a:ln>
           <a:extLst>
             <a:ext uri="{909E8E84-426E-40dd-AFC4-6F175D3DCCD1}">
-              <a14:hiddenFill xmlns:a14="http://schemas.microsoft.com/office/drawing/2010/main" xmlns="">
+              <a14:hiddenFill xmlns="" xmlns:a14="http://schemas.microsoft.com/office/drawing/2010/main">
                 <a:solidFill>
                   <a:srgbClr val="FFFFFF"/>
                 </a:solidFill>
               </a14:hiddenFill>
             </a:ext>
             <a:ext uri="{91240B29-F687-4f45-9708-019B960494DF}">
-              <a14:hiddenLine xmlns:a14="http://schemas.microsoft.com/office/drawing/2010/main" xmlns="" w="9525">
+              <a14:hiddenLine xmlns="" xmlns:a14="http://schemas.microsoft.com/office/drawing/2010/main" w="9525">
                 <a:solidFill>
                   <a:srgbClr val="000000"/>
                 </a:solidFill>
@@ -11057,14 +11057,14 @@
           </a:ln>
           <a:extLst>
             <a:ext uri="{909E8E84-426E-40dd-AFC4-6F175D3DCCD1}">
-              <a14:hiddenFill xmlns:a14="http://schemas.microsoft.com/office/drawing/2010/main" xmlns="">
+              <a14:hiddenFill xmlns="" xmlns:a14="http://schemas.microsoft.com/office/drawing/2010/main">
                 <a:solidFill>
                   <a:srgbClr val="FFFFFF"/>
                 </a:solidFill>
               </a14:hiddenFill>
             </a:ext>
             <a:ext uri="{91240B29-F687-4f45-9708-019B960494DF}">
-              <a14:hiddenLine xmlns:a14="http://schemas.microsoft.com/office/drawing/2010/main" xmlns="" w="9525">
+              <a14:hiddenLine xmlns="" xmlns:a14="http://schemas.microsoft.com/office/drawing/2010/main" w="9525">
                 <a:solidFill>
                   <a:srgbClr val="000000"/>
                 </a:solidFill>
@@ -12548,14 +12548,14 @@
           </a:ln>
           <a:extLst>
             <a:ext uri="{909E8E84-426E-40dd-AFC4-6F175D3DCCD1}">
-              <a14:hiddenFill xmlns:a14="http://schemas.microsoft.com/office/drawing/2010/main" xmlns="">
+              <a14:hiddenFill xmlns="" xmlns:a14="http://schemas.microsoft.com/office/drawing/2010/main">
                 <a:solidFill>
                   <a:srgbClr val="FFFFFF"/>
                 </a:solidFill>
               </a14:hiddenFill>
             </a:ext>
             <a:ext uri="{91240B29-F687-4f45-9708-019B960494DF}">
-              <a14:hiddenLine xmlns:a14="http://schemas.microsoft.com/office/drawing/2010/main" xmlns="" w="9525">
+              <a14:hiddenLine xmlns="" xmlns:a14="http://schemas.microsoft.com/office/drawing/2010/main" w="9525">
                 <a:solidFill>
                   <a:srgbClr val="000000"/>
                 </a:solidFill>
@@ -13944,14 +13944,14 @@
           </a:ln>
           <a:extLst>
             <a:ext uri="{909E8E84-426E-40dd-AFC4-6F175D3DCCD1}">
-              <a14:hiddenFill xmlns:a14="http://schemas.microsoft.com/office/drawing/2010/main" xmlns="">
+              <a14:hiddenFill xmlns="" xmlns:a14="http://schemas.microsoft.com/office/drawing/2010/main">
                 <a:solidFill>
                   <a:srgbClr val="FFFFFF"/>
                 </a:solidFill>
               </a14:hiddenFill>
             </a:ext>
             <a:ext uri="{91240B29-F687-4f45-9708-019B960494DF}">
-              <a14:hiddenLine xmlns:a14="http://schemas.microsoft.com/office/drawing/2010/main" xmlns="" w="9525">
+              <a14:hiddenLine xmlns="" xmlns:a14="http://schemas.microsoft.com/office/drawing/2010/main" w="9525">
                 <a:solidFill>
                   <a:srgbClr val="000000"/>
                 </a:solidFill>
@@ -14523,14 +14523,14 @@
           </a:ln>
           <a:extLst>
             <a:ext uri="{909E8E84-426E-40dd-AFC4-6F175D3DCCD1}">
-              <a14:hiddenFill xmlns:a14="http://schemas.microsoft.com/office/drawing/2010/main" xmlns="">
+              <a14:hiddenFill xmlns="" xmlns:a14="http://schemas.microsoft.com/office/drawing/2010/main">
                 <a:solidFill>
                   <a:srgbClr val="FFFFFF"/>
                 </a:solidFill>
               </a14:hiddenFill>
             </a:ext>
             <a:ext uri="{91240B29-F687-4f45-9708-019B960494DF}">
-              <a14:hiddenLine xmlns:a14="http://schemas.microsoft.com/office/drawing/2010/main" xmlns="" w="9525">
+              <a14:hiddenLine xmlns="" xmlns:a14="http://schemas.microsoft.com/office/drawing/2010/main" w="9525">
                 <a:solidFill>
                   <a:srgbClr val="000000"/>
                 </a:solidFill>
@@ -15111,14 +15111,14 @@
           </a:ln>
           <a:extLst>
             <a:ext uri="{909E8E84-426E-40dd-AFC4-6F175D3DCCD1}">
-              <a14:hiddenFill xmlns:a14="http://schemas.microsoft.com/office/drawing/2010/main" xmlns="">
+              <a14:hiddenFill xmlns="" xmlns:a14="http://schemas.microsoft.com/office/drawing/2010/main">
                 <a:solidFill>
                   <a:srgbClr val="FFFFFF"/>
                 </a:solidFill>
               </a14:hiddenFill>
             </a:ext>
             <a:ext uri="{91240B29-F687-4f45-9708-019B960494DF}">
-              <a14:hiddenLine xmlns:a14="http://schemas.microsoft.com/office/drawing/2010/main" xmlns="" w="9525">
+              <a14:hiddenLine xmlns="" xmlns:a14="http://schemas.microsoft.com/office/drawing/2010/main" w="9525">
                 <a:solidFill>
                   <a:srgbClr val="000000"/>
                 </a:solidFill>
@@ -16079,14 +16079,14 @@
           </a:ln>
           <a:extLst>
             <a:ext uri="{909E8E84-426E-40dd-AFC4-6F175D3DCCD1}">
-              <a14:hiddenFill xmlns:a14="http://schemas.microsoft.com/office/drawing/2010/main" xmlns="">
+              <a14:hiddenFill xmlns="" xmlns:a14="http://schemas.microsoft.com/office/drawing/2010/main">
                 <a:solidFill>
                   <a:srgbClr val="FFFFFF"/>
                 </a:solidFill>
               </a14:hiddenFill>
             </a:ext>
             <a:ext uri="{91240B29-F687-4f45-9708-019B960494DF}">
-              <a14:hiddenLine xmlns:a14="http://schemas.microsoft.com/office/drawing/2010/main" xmlns="" w="9525">
+              <a14:hiddenLine xmlns="" xmlns:a14="http://schemas.microsoft.com/office/drawing/2010/main" w="9525">
                 <a:solidFill>
                   <a:srgbClr val="000000"/>
                 </a:solidFill>
@@ -16848,14 +16848,14 @@
           </a:ln>
           <a:extLst>
             <a:ext uri="{909E8E84-426E-40dd-AFC4-6F175D3DCCD1}">
-              <a14:hiddenFill xmlns:a14="http://schemas.microsoft.com/office/drawing/2010/main" xmlns="">
+              <a14:hiddenFill xmlns="" xmlns:a14="http://schemas.microsoft.com/office/drawing/2010/main">
                 <a:solidFill>
                   <a:srgbClr val="FFFFFF"/>
                 </a:solidFill>
               </a14:hiddenFill>
             </a:ext>
             <a:ext uri="{91240B29-F687-4f45-9708-019B960494DF}">
-              <a14:hiddenLine xmlns:a14="http://schemas.microsoft.com/office/drawing/2010/main" xmlns="" w="9525">
+              <a14:hiddenLine xmlns="" xmlns:a14="http://schemas.microsoft.com/office/drawing/2010/main" w="9525">
                 <a:solidFill>
                   <a:srgbClr val="000000"/>
                 </a:solidFill>

</xml_diff>

<commit_message>
Fixes an incorrect slide module number
Some of the slides stated 1. Some of them stated 2. The
master needed to be updatd in one more location.
</commit_message>
<xml_diff>
--- a/02-why_write_tests_why_is_that_hard.pptx
+++ b/02-why_write_tests_why_is_that_hard.pptx
@@ -6611,7 +6611,7 @@
               <a:pPr>
                 <a:defRPr/>
               </a:pPr>
-              <a:t>2016-04-12</a:t>
+              <a:t>2016-09-06</a:t>
             </a:fld>
             <a:endParaRPr lang="en-US" dirty="0"/>
           </a:p>
@@ -6794,7 +6794,7 @@
               <a:pPr>
                 <a:defRPr/>
               </a:pPr>
-              <a:t>2016-04-12</a:t>
+              <a:t>2016-09-06</a:t>
             </a:fld>
             <a:endParaRPr lang="en-US" dirty="0"/>
           </a:p>
@@ -10397,14 +10397,14 @@
           </a:ln>
           <a:extLst>
             <a:ext uri="{909E8E84-426E-40dd-AFC4-6F175D3DCCD1}">
-              <a14:hiddenFill xmlns="" xmlns:a14="http://schemas.microsoft.com/office/drawing/2010/main">
+              <a14:hiddenFill xmlns:a14="http://schemas.microsoft.com/office/drawing/2010/main" xmlns="">
                 <a:solidFill>
                   <a:srgbClr val="FFFFFF"/>
                 </a:solidFill>
               </a14:hiddenFill>
             </a:ext>
             <a:ext uri="{91240B29-F687-4f45-9708-019B960494DF}">
-              <a14:hiddenLine xmlns="" xmlns:a14="http://schemas.microsoft.com/office/drawing/2010/main" w="9525">
+              <a14:hiddenLine xmlns:a14="http://schemas.microsoft.com/office/drawing/2010/main" xmlns="" w="9525">
                 <a:solidFill>
                   <a:srgbClr val="000000"/>
                 </a:solidFill>
@@ -10552,14 +10552,14 @@
           </a:ln>
           <a:extLst>
             <a:ext uri="{909E8E84-426E-40dd-AFC4-6F175D3DCCD1}">
-              <a14:hiddenFill xmlns="" xmlns:a14="http://schemas.microsoft.com/office/drawing/2010/main">
+              <a14:hiddenFill xmlns:a14="http://schemas.microsoft.com/office/drawing/2010/main" xmlns="">
                 <a:solidFill>
                   <a:srgbClr val="FFFFFF"/>
                 </a:solidFill>
               </a14:hiddenFill>
             </a:ext>
             <a:ext uri="{91240B29-F687-4f45-9708-019B960494DF}">
-              <a14:hiddenLine xmlns="" xmlns:a14="http://schemas.microsoft.com/office/drawing/2010/main" w="9525">
+              <a14:hiddenLine xmlns:a14="http://schemas.microsoft.com/office/drawing/2010/main" xmlns="" w="9525">
                 <a:solidFill>
                   <a:srgbClr val="000000"/>
                 </a:solidFill>
@@ -11057,14 +11057,14 @@
           </a:ln>
           <a:extLst>
             <a:ext uri="{909E8E84-426E-40dd-AFC4-6F175D3DCCD1}">
-              <a14:hiddenFill xmlns="" xmlns:a14="http://schemas.microsoft.com/office/drawing/2010/main">
+              <a14:hiddenFill xmlns:a14="http://schemas.microsoft.com/office/drawing/2010/main" xmlns="">
                 <a:solidFill>
                   <a:srgbClr val="FFFFFF"/>
                 </a:solidFill>
               </a14:hiddenFill>
             </a:ext>
             <a:ext uri="{91240B29-F687-4f45-9708-019B960494DF}">
-              <a14:hiddenLine xmlns="" xmlns:a14="http://schemas.microsoft.com/office/drawing/2010/main" w="9525">
+              <a14:hiddenLine xmlns:a14="http://schemas.microsoft.com/office/drawing/2010/main" xmlns="" w="9525">
                 <a:solidFill>
                   <a:srgbClr val="000000"/>
                 </a:solidFill>
@@ -12548,14 +12548,14 @@
           </a:ln>
           <a:extLst>
             <a:ext uri="{909E8E84-426E-40dd-AFC4-6F175D3DCCD1}">
-              <a14:hiddenFill xmlns="" xmlns:a14="http://schemas.microsoft.com/office/drawing/2010/main">
+              <a14:hiddenFill xmlns:a14="http://schemas.microsoft.com/office/drawing/2010/main" xmlns="">
                 <a:solidFill>
                   <a:srgbClr val="FFFFFF"/>
                 </a:solidFill>
               </a14:hiddenFill>
             </a:ext>
             <a:ext uri="{91240B29-F687-4f45-9708-019B960494DF}">
-              <a14:hiddenLine xmlns="" xmlns:a14="http://schemas.microsoft.com/office/drawing/2010/main" w="9525">
+              <a14:hiddenLine xmlns:a14="http://schemas.microsoft.com/office/drawing/2010/main" xmlns="" w="9525">
                 <a:solidFill>
                   <a:srgbClr val="000000"/>
                 </a:solidFill>
@@ -13944,14 +13944,14 @@
           </a:ln>
           <a:extLst>
             <a:ext uri="{909E8E84-426E-40dd-AFC4-6F175D3DCCD1}">
-              <a14:hiddenFill xmlns="" xmlns:a14="http://schemas.microsoft.com/office/drawing/2010/main">
+              <a14:hiddenFill xmlns:a14="http://schemas.microsoft.com/office/drawing/2010/main" xmlns="">
                 <a:solidFill>
                   <a:srgbClr val="FFFFFF"/>
                 </a:solidFill>
               </a14:hiddenFill>
             </a:ext>
             <a:ext uri="{91240B29-F687-4f45-9708-019B960494DF}">
-              <a14:hiddenLine xmlns="" xmlns:a14="http://schemas.microsoft.com/office/drawing/2010/main" w="9525">
+              <a14:hiddenLine xmlns:a14="http://schemas.microsoft.com/office/drawing/2010/main" xmlns="" w="9525">
                 <a:solidFill>
                   <a:srgbClr val="000000"/>
                 </a:solidFill>
@@ -14523,14 +14523,14 @@
           </a:ln>
           <a:extLst>
             <a:ext uri="{909E8E84-426E-40dd-AFC4-6F175D3DCCD1}">
-              <a14:hiddenFill xmlns="" xmlns:a14="http://schemas.microsoft.com/office/drawing/2010/main">
+              <a14:hiddenFill xmlns:a14="http://schemas.microsoft.com/office/drawing/2010/main" xmlns="">
                 <a:solidFill>
                   <a:srgbClr val="FFFFFF"/>
                 </a:solidFill>
               </a14:hiddenFill>
             </a:ext>
             <a:ext uri="{91240B29-F687-4f45-9708-019B960494DF}">
-              <a14:hiddenLine xmlns="" xmlns:a14="http://schemas.microsoft.com/office/drawing/2010/main" w="9525">
+              <a14:hiddenLine xmlns:a14="http://schemas.microsoft.com/office/drawing/2010/main" xmlns="" w="9525">
                 <a:solidFill>
                   <a:srgbClr val="000000"/>
                 </a:solidFill>
@@ -15111,14 +15111,14 @@
           </a:ln>
           <a:extLst>
             <a:ext uri="{909E8E84-426E-40dd-AFC4-6F175D3DCCD1}">
-              <a14:hiddenFill xmlns="" xmlns:a14="http://schemas.microsoft.com/office/drawing/2010/main">
+              <a14:hiddenFill xmlns:a14="http://schemas.microsoft.com/office/drawing/2010/main" xmlns="">
                 <a:solidFill>
                   <a:srgbClr val="FFFFFF"/>
                 </a:solidFill>
               </a14:hiddenFill>
             </a:ext>
             <a:ext uri="{91240B29-F687-4f45-9708-019B960494DF}">
-              <a14:hiddenLine xmlns="" xmlns:a14="http://schemas.microsoft.com/office/drawing/2010/main" w="9525">
+              <a14:hiddenLine xmlns:a14="http://schemas.microsoft.com/office/drawing/2010/main" xmlns="" w="9525">
                 <a:solidFill>
                   <a:srgbClr val="000000"/>
                 </a:solidFill>
@@ -16079,14 +16079,14 @@
           </a:ln>
           <a:extLst>
             <a:ext uri="{909E8E84-426E-40dd-AFC4-6F175D3DCCD1}">
-              <a14:hiddenFill xmlns="" xmlns:a14="http://schemas.microsoft.com/office/drawing/2010/main">
+              <a14:hiddenFill xmlns:a14="http://schemas.microsoft.com/office/drawing/2010/main" xmlns="">
                 <a:solidFill>
                   <a:srgbClr val="FFFFFF"/>
                 </a:solidFill>
               </a14:hiddenFill>
             </a:ext>
             <a:ext uri="{91240B29-F687-4f45-9708-019B960494DF}">
-              <a14:hiddenLine xmlns="" xmlns:a14="http://schemas.microsoft.com/office/drawing/2010/main" w="9525">
+              <a14:hiddenLine xmlns:a14="http://schemas.microsoft.com/office/drawing/2010/main" xmlns="" w="9525">
                 <a:solidFill>
                   <a:srgbClr val="000000"/>
                 </a:solidFill>
@@ -16264,10 +16264,21 @@
                 <a:ea typeface="+mn-ea"/>
                 <a:cs typeface="+mn-cs"/>
               </a:rPr>
-              <a:t>1-</a:t>
+              <a:t>2</a:t>
+            </a:r>
+            <a:r>
+              <a:rPr lang="en-US" dirty="0" smtClean="0">
+                <a:solidFill>
+                  <a:srgbClr val="7F7F7F"/>
+                </a:solidFill>
+                <a:latin typeface="+mn-lt"/>
+                <a:ea typeface="+mn-ea"/>
+                <a:cs typeface="+mn-cs"/>
+              </a:rPr>
+              <a:t>-</a:t>
             </a:r>
             <a:fld id="{F0B79B2F-E1DD-4D43-95B3-EA08C411D807}" type="slidenum">
-              <a:rPr lang="en-US">
+              <a:rPr lang="en-US" smtClean="0">
                 <a:solidFill>
                   <a:srgbClr val="7F7F7F"/>
                 </a:solidFill>
@@ -16848,14 +16859,14 @@
           </a:ln>
           <a:extLst>
             <a:ext uri="{909E8E84-426E-40dd-AFC4-6F175D3DCCD1}">
-              <a14:hiddenFill xmlns="" xmlns:a14="http://schemas.microsoft.com/office/drawing/2010/main">
+              <a14:hiddenFill xmlns:a14="http://schemas.microsoft.com/office/drawing/2010/main" xmlns="">
                 <a:solidFill>
                   <a:srgbClr val="FFFFFF"/>
                 </a:solidFill>
               </a14:hiddenFill>
             </a:ext>
             <a:ext uri="{91240B29-F687-4f45-9708-019B960494DF}">
-              <a14:hiddenLine xmlns="" xmlns:a14="http://schemas.microsoft.com/office/drawing/2010/main" w="9525">
+              <a14:hiddenLine xmlns:a14="http://schemas.microsoft.com/office/drawing/2010/main" xmlns="" w="9525">
                 <a:solidFill>
                   <a:srgbClr val="000000"/>
                 </a:solidFill>
@@ -21191,6 +21202,15 @@
 </file>
 
 <file path=customXml/item1.xml><?xml version="1.0" encoding="utf-8"?>
+<?mso-contentType ?>
+<FormTemplates xmlns="http://schemas.microsoft.com/sharepoint/v3/contenttype/forms">
+  <Display>DocumentLibraryForm</Display>
+  <Edit>DocumentLibraryForm</Edit>
+  <New>DocumentLibraryForm</New>
+</FormTemplates>
+</file>
+
+<file path=customXml/item2.xml><?xml version="1.0" encoding="utf-8"?>
 <p:properties xmlns:p="http://schemas.microsoft.com/office/2006/metadata/properties" xmlns:xsi="http://www.w3.org/2001/XMLSchema-instance" xmlns:pc="http://schemas.microsoft.com/office/infopath/2007/PartnerControls">
   <documentManagement>
     <_dlc_DocId xmlns="7bb5d761-a2ea-4873-95f7-7a6658fb3ef0">M4CWTKMW727E-592-73</_dlc_DocId>
@@ -21202,62 +21222,7 @@
 </p:properties>
 </file>
 
-<file path=customXml/item2.xml><?xml version="1.0" encoding="utf-8"?>
-<?mso-contentType ?>
-<FormTemplates xmlns="http://schemas.microsoft.com/sharepoint/v3/contenttype/forms">
-  <Display>DocumentLibraryForm</Display>
-  <Edit>DocumentLibraryForm</Edit>
-  <New>DocumentLibraryForm</New>
-</FormTemplates>
-</file>
-
 <file path=customXml/item3.xml><?xml version="1.0" encoding="utf-8"?>
-<?mso-contentType ?>
-<spe:Receivers xmlns:spe="http://schemas.microsoft.com/sharepoint/events">
-  <Receiver>
-    <Name>Document ID Generator</Name>
-    <Synchronization>Synchronous</Synchronization>
-    <Type>10001</Type>
-    <SequenceNumber>1000</SequenceNumber>
-    <Assembly>Microsoft.Office.DocumentManagement, Version=14.0.0.0, Culture=neutral, PublicKeyToken=71e9bce111e9429c</Assembly>
-    <Class>Microsoft.Office.DocumentManagement.Internal.DocIdHandler</Class>
-    <Data/>
-    <Filter/>
-  </Receiver>
-  <Receiver>
-    <Name>Document ID Generator</Name>
-    <Synchronization>Synchronous</Synchronization>
-    <Type>10002</Type>
-    <SequenceNumber>1001</SequenceNumber>
-    <Assembly>Microsoft.Office.DocumentManagement, Version=14.0.0.0, Culture=neutral, PublicKeyToken=71e9bce111e9429c</Assembly>
-    <Class>Microsoft.Office.DocumentManagement.Internal.DocIdHandler</Class>
-    <Data/>
-    <Filter/>
-  </Receiver>
-  <Receiver>
-    <Name>Document ID Generator</Name>
-    <Synchronization>Synchronous</Synchronization>
-    <Type>10004</Type>
-    <SequenceNumber>1002</SequenceNumber>
-    <Assembly>Microsoft.Office.DocumentManagement, Version=14.0.0.0, Culture=neutral, PublicKeyToken=71e9bce111e9429c</Assembly>
-    <Class>Microsoft.Office.DocumentManagement.Internal.DocIdHandler</Class>
-    <Data/>
-    <Filter/>
-  </Receiver>
-  <Receiver>
-    <Name>Document ID Generator</Name>
-    <Synchronization>Synchronous</Synchronization>
-    <Type>10006</Type>
-    <SequenceNumber>1003</SequenceNumber>
-    <Assembly>Microsoft.Office.DocumentManagement, Version=14.0.0.0, Culture=neutral, PublicKeyToken=71e9bce111e9429c</Assembly>
-    <Class>Microsoft.Office.DocumentManagement.Internal.DocIdHandler</Class>
-    <Data/>
-    <Filter/>
-  </Receiver>
-</spe:Receivers>
-</file>
-
-<file path=customXml/item4.xml><?xml version="1.0" encoding="utf-8"?>
 <ct:contentTypeSchema xmlns:ct="http://schemas.microsoft.com/office/2006/metadata/contentType" xmlns:ma="http://schemas.microsoft.com/office/2006/metadata/properties/metaAttributes" ct:_="" ma:_="" ma:contentTypeName="Document" ma:contentTypeID="0x0101000812F700BE7F874999720E88173FE491" ma:contentTypeVersion="0" ma:contentTypeDescription="Create a new document." ma:contentTypeScope="" ma:versionID="3f79f408e2ca720b7aba6e0e32464d0c">
   <xsd:schema xmlns:xsd="http://www.w3.org/2001/XMLSchema" xmlns:xs="http://www.w3.org/2001/XMLSchema" xmlns:p="http://schemas.microsoft.com/office/2006/metadata/properties" xmlns:ns2="7bb5d761-a2ea-4873-95f7-7a6658fb3ef0" targetNamespace="http://schemas.microsoft.com/office/2006/metadata/properties" ma:root="true" ma:fieldsID="1e062cd38ba31e406bfc4340fbc7f87a" ns2:_="">
     <xsd:import namespace="7bb5d761-a2ea-4873-95f7-7a6658fb3ef0"/>
@@ -21402,7 +21367,61 @@
 </ct:contentTypeSchema>
 </file>
 
+<file path=customXml/item4.xml><?xml version="1.0" encoding="utf-8"?>
+<?mso-contentType ?>
+<spe:Receivers xmlns:spe="http://schemas.microsoft.com/sharepoint/events">
+  <Receiver>
+    <Name>Document ID Generator</Name>
+    <Synchronization>Synchronous</Synchronization>
+    <Type>10001</Type>
+    <SequenceNumber>1000</SequenceNumber>
+    <Assembly>Microsoft.Office.DocumentManagement, Version=14.0.0.0, Culture=neutral, PublicKeyToken=71e9bce111e9429c</Assembly>
+    <Class>Microsoft.Office.DocumentManagement.Internal.DocIdHandler</Class>
+    <Data/>
+    <Filter/>
+  </Receiver>
+  <Receiver>
+    <Name>Document ID Generator</Name>
+    <Synchronization>Synchronous</Synchronization>
+    <Type>10002</Type>
+    <SequenceNumber>1001</SequenceNumber>
+    <Assembly>Microsoft.Office.DocumentManagement, Version=14.0.0.0, Culture=neutral, PublicKeyToken=71e9bce111e9429c</Assembly>
+    <Class>Microsoft.Office.DocumentManagement.Internal.DocIdHandler</Class>
+    <Data/>
+    <Filter/>
+  </Receiver>
+  <Receiver>
+    <Name>Document ID Generator</Name>
+    <Synchronization>Synchronous</Synchronization>
+    <Type>10004</Type>
+    <SequenceNumber>1002</SequenceNumber>
+    <Assembly>Microsoft.Office.DocumentManagement, Version=14.0.0.0, Culture=neutral, PublicKeyToken=71e9bce111e9429c</Assembly>
+    <Class>Microsoft.Office.DocumentManagement.Internal.DocIdHandler</Class>
+    <Data/>
+    <Filter/>
+  </Receiver>
+  <Receiver>
+    <Name>Document ID Generator</Name>
+    <Synchronization>Synchronous</Synchronization>
+    <Type>10006</Type>
+    <SequenceNumber>1003</SequenceNumber>
+    <Assembly>Microsoft.Office.DocumentManagement, Version=14.0.0.0, Culture=neutral, PublicKeyToken=71e9bce111e9429c</Assembly>
+    <Class>Microsoft.Office.DocumentManagement.Internal.DocIdHandler</Class>
+    <Data/>
+    <Filter/>
+  </Receiver>
+</spe:Receivers>
+</file>
+
 <file path=customXml/itemProps1.xml><?xml version="1.0" encoding="utf-8"?>
+<ds:datastoreItem xmlns:ds="http://schemas.openxmlformats.org/officeDocument/2006/customXml" ds:itemID="{5CDEB364-43EC-4510-9881-539C2A3FCE9E}">
+  <ds:schemaRefs>
+    <ds:schemaRef ds:uri="http://schemas.microsoft.com/sharepoint/v3/contenttype/forms"/>
+  </ds:schemaRefs>
+</ds:datastoreItem>
+</file>
+
+<file path=customXml/itemProps2.xml><?xml version="1.0" encoding="utf-8"?>
 <ds:datastoreItem xmlns:ds="http://schemas.openxmlformats.org/officeDocument/2006/customXml" ds:itemID="{6921749B-AEB7-461B-845F-603CABD25259}">
   <ds:schemaRefs>
     <ds:schemaRef ds:uri="7bb5d761-a2ea-4873-95f7-7a6658fb3ef0"/>
@@ -21418,23 +21437,7 @@
 </ds:datastoreItem>
 </file>
 
-<file path=customXml/itemProps2.xml><?xml version="1.0" encoding="utf-8"?>
-<ds:datastoreItem xmlns:ds="http://schemas.openxmlformats.org/officeDocument/2006/customXml" ds:itemID="{5CDEB364-43EC-4510-9881-539C2A3FCE9E}">
-  <ds:schemaRefs>
-    <ds:schemaRef ds:uri="http://schemas.microsoft.com/sharepoint/v3/contenttype/forms"/>
-  </ds:schemaRefs>
-</ds:datastoreItem>
-</file>
-
 <file path=customXml/itemProps3.xml><?xml version="1.0" encoding="utf-8"?>
-<ds:datastoreItem xmlns:ds="http://schemas.openxmlformats.org/officeDocument/2006/customXml" ds:itemID="{B13EBC30-FE27-4C6A-B723-23FC2188F7DC}">
-  <ds:schemaRefs>
-    <ds:schemaRef ds:uri="http://schemas.microsoft.com/sharepoint/events"/>
-  </ds:schemaRefs>
-</ds:datastoreItem>
-</file>
-
-<file path=customXml/itemProps4.xml><?xml version="1.0" encoding="utf-8"?>
 <ds:datastoreItem xmlns:ds="http://schemas.openxmlformats.org/officeDocument/2006/customXml" ds:itemID="{164479E5-0B02-49AC-B79E-EC1D6164DDD3}">
   <ds:schemaRefs>
     <ds:schemaRef ds:uri="http://schemas.microsoft.com/office/2006/metadata/contentType"/>
@@ -21450,4 +21453,12 @@
     <ds:schemaRef ds:uri="http://schemas.microsoft.com/internal/obd"/>
   </ds:schemaRefs>
 </ds:datastoreItem>
+</file>
+
+<file path=customXml/itemProps4.xml><?xml version="1.0" encoding="utf-8"?>
+<ds:datastoreItem xmlns:ds="http://schemas.openxmlformats.org/officeDocument/2006/customXml" ds:itemID="{B13EBC30-FE27-4C6A-B723-23FC2188F7DC}">
+  <ds:schemaRefs>
+    <ds:schemaRef ds:uri="http://schemas.microsoft.com/sharepoint/events"/>
+  </ds:schemaRefs>
+</ds:datastoreItem>
 </file>
</xml_diff>